<commit_message>
update docs and diagrams
</commit_message>
<xml_diff>
--- a/docs/diagrams/ModelComponentClassDiagram.pptx
+++ b/docs/diagrams/ModelComponentClassDiagram.pptx
@@ -208,7 +208,7 @@
           <a:p>
             <a:fld id="{F5CC4B3F-88C1-4FFA-B1B6-F41C21DC6924}" type="datetimeFigureOut">
               <a:rPr lang="en-US" smtClean="0"/>
-              <a:t>10/15/2018</a:t>
+              <a:t>17-Oct-18</a:t>
             </a:fld>
             <a:endParaRPr lang="en-US"/>
           </a:p>
@@ -654,7 +654,7 @@
           <a:p>
             <a:fld id="{78C97017-6FC3-485B-9764-EAC9E56C1D49}" type="datetimeFigureOut">
               <a:rPr lang="en-US" smtClean="0"/>
-              <a:t>10/15/2018</a:t>
+              <a:t>17-Oct-18</a:t>
             </a:fld>
             <a:endParaRPr lang="en-US"/>
           </a:p>
@@ -822,7 +822,7 @@
           <a:p>
             <a:fld id="{78C97017-6FC3-485B-9764-EAC9E56C1D49}" type="datetimeFigureOut">
               <a:rPr lang="en-US" smtClean="0"/>
-              <a:t>10/15/2018</a:t>
+              <a:t>17-Oct-18</a:t>
             </a:fld>
             <a:endParaRPr lang="en-US"/>
           </a:p>
@@ -1000,7 +1000,7 @@
           <a:p>
             <a:fld id="{78C97017-6FC3-485B-9764-EAC9E56C1D49}" type="datetimeFigureOut">
               <a:rPr lang="en-US" smtClean="0"/>
-              <a:t>10/15/2018</a:t>
+              <a:t>17-Oct-18</a:t>
             </a:fld>
             <a:endParaRPr lang="en-US"/>
           </a:p>
@@ -1168,7 +1168,7 @@
           <a:p>
             <a:fld id="{78C97017-6FC3-485B-9764-EAC9E56C1D49}" type="datetimeFigureOut">
               <a:rPr lang="en-US" smtClean="0"/>
-              <a:t>10/15/2018</a:t>
+              <a:t>17-Oct-18</a:t>
             </a:fld>
             <a:endParaRPr lang="en-US"/>
           </a:p>
@@ -1413,7 +1413,7 @@
           <a:p>
             <a:fld id="{78C97017-6FC3-485B-9764-EAC9E56C1D49}" type="datetimeFigureOut">
               <a:rPr lang="en-US" smtClean="0"/>
-              <a:t>10/15/2018</a:t>
+              <a:t>17-Oct-18</a:t>
             </a:fld>
             <a:endParaRPr lang="en-US"/>
           </a:p>
@@ -1698,7 +1698,7 @@
           <a:p>
             <a:fld id="{78C97017-6FC3-485B-9764-EAC9E56C1D49}" type="datetimeFigureOut">
               <a:rPr lang="en-US" smtClean="0"/>
-              <a:t>10/15/2018</a:t>
+              <a:t>17-Oct-18</a:t>
             </a:fld>
             <a:endParaRPr lang="en-US"/>
           </a:p>
@@ -2117,7 +2117,7 @@
           <a:p>
             <a:fld id="{78C97017-6FC3-485B-9764-EAC9E56C1D49}" type="datetimeFigureOut">
               <a:rPr lang="en-US" smtClean="0"/>
-              <a:t>10/15/2018</a:t>
+              <a:t>17-Oct-18</a:t>
             </a:fld>
             <a:endParaRPr lang="en-US"/>
           </a:p>
@@ -2234,7 +2234,7 @@
           <a:p>
             <a:fld id="{78C97017-6FC3-485B-9764-EAC9E56C1D49}" type="datetimeFigureOut">
               <a:rPr lang="en-US" smtClean="0"/>
-              <a:t>10/15/2018</a:t>
+              <a:t>17-Oct-18</a:t>
             </a:fld>
             <a:endParaRPr lang="en-US"/>
           </a:p>
@@ -2329,7 +2329,7 @@
           <a:p>
             <a:fld id="{78C97017-6FC3-485B-9764-EAC9E56C1D49}" type="datetimeFigureOut">
               <a:rPr lang="en-US" smtClean="0"/>
-              <a:t>10/15/2018</a:t>
+              <a:t>17-Oct-18</a:t>
             </a:fld>
             <a:endParaRPr lang="en-US"/>
           </a:p>
@@ -2604,7 +2604,7 @@
           <a:p>
             <a:fld id="{78C97017-6FC3-485B-9764-EAC9E56C1D49}" type="datetimeFigureOut">
               <a:rPr lang="en-US" smtClean="0"/>
-              <a:t>10/15/2018</a:t>
+              <a:t>17-Oct-18</a:t>
             </a:fld>
             <a:endParaRPr lang="en-US"/>
           </a:p>
@@ -2856,7 +2856,7 @@
           <a:p>
             <a:fld id="{78C97017-6FC3-485B-9764-EAC9E56C1D49}" type="datetimeFigureOut">
               <a:rPr lang="en-US" smtClean="0"/>
-              <a:t>10/15/2018</a:t>
+              <a:t>17-Oct-18</a:t>
             </a:fld>
             <a:endParaRPr lang="en-US"/>
           </a:p>
@@ -3067,7 +3067,7 @@
           <a:p>
             <a:fld id="{78C97017-6FC3-485B-9764-EAC9E56C1D49}" type="datetimeFigureOut">
               <a:rPr lang="en-US" smtClean="0"/>
-              <a:t>10/15/2018</a:t>
+              <a:t>17-Oct-18</a:t>
             </a:fld>
             <a:endParaRPr lang="en-US"/>
           </a:p>
@@ -3450,8 +3450,8 @@
         </p:nvSpPr>
         <p:spPr>
           <a:xfrm>
-            <a:off x="304801" y="242900"/>
-            <a:ext cx="8839200" cy="5846757"/>
+            <a:off x="304801" y="236898"/>
+            <a:ext cx="8839200" cy="6089657"/>
           </a:xfrm>
           <a:prstGeom prst="roundRect">
             <a:avLst>
@@ -4348,7 +4348,7 @@
         </p:nvSpPr>
         <p:spPr>
           <a:xfrm>
-            <a:off x="7951440" y="4176025"/>
+            <a:off x="7955436" y="4736791"/>
             <a:ext cx="708186" cy="285783"/>
           </a:xfrm>
           <a:prstGeom prst="rect">
@@ -4448,14 +4448,15 @@
           <p:cNvPr id="79" name="Elbow Connector 78"/>
           <p:cNvCxnSpPr>
             <a:cxnSpLocks/>
+            <a:stCxn id="78" idx="3"/>
             <a:endCxn id="76" idx="1"/>
           </p:cNvCxnSpPr>
           <p:nvPr/>
         </p:nvCxnSpPr>
         <p:spPr>
           <a:xfrm>
-            <a:off x="6510483" y="4015046"/>
-            <a:ext cx="1440957" cy="303871"/>
+            <a:off x="6510483" y="4015354"/>
+            <a:ext cx="1444953" cy="864329"/>
           </a:xfrm>
           <a:prstGeom prst="bentConnector3">
             <a:avLst/>
@@ -4492,7 +4493,7 @@
         </p:nvSpPr>
         <p:spPr>
           <a:xfrm>
-            <a:off x="7951440" y="4499003"/>
+            <a:off x="7955436" y="5059769"/>
             <a:ext cx="708186" cy="285783"/>
           </a:xfrm>
           <a:prstGeom prst="rect">
@@ -4553,7 +4554,7 @@
         <p:spPr>
           <a:xfrm>
             <a:off x="6510483" y="4015354"/>
-            <a:ext cx="1440957" cy="626541"/>
+            <a:ext cx="1444953" cy="1187307"/>
           </a:xfrm>
           <a:prstGeom prst="bentConnector3">
             <a:avLst/>
@@ -4590,7 +4591,7 @@
         </p:nvSpPr>
         <p:spPr>
           <a:xfrm>
-            <a:off x="7951440" y="4821981"/>
+            <a:off x="7955436" y="5382747"/>
             <a:ext cx="708186" cy="285783"/>
           </a:xfrm>
           <a:prstGeom prst="rect">
@@ -4651,7 +4652,7 @@
         <p:spPr>
           <a:xfrm>
             <a:off x="6510483" y="4015354"/>
-            <a:ext cx="1440957" cy="949519"/>
+            <a:ext cx="1444953" cy="1510285"/>
           </a:xfrm>
           <a:prstGeom prst="bentConnector3">
             <a:avLst/>
@@ -4688,7 +4689,7 @@
         </p:nvSpPr>
         <p:spPr>
           <a:xfrm>
-            <a:off x="7951440" y="5144958"/>
+            <a:off x="7965363" y="5657214"/>
             <a:ext cx="708186" cy="285783"/>
           </a:xfrm>
           <a:prstGeom prst="rect">
@@ -4749,7 +4750,7 @@
         <p:spPr>
           <a:xfrm>
             <a:off x="6510483" y="4015354"/>
-            <a:ext cx="1440957" cy="1272496"/>
+            <a:ext cx="1454880" cy="1784752"/>
           </a:xfrm>
           <a:prstGeom prst="bentConnector3">
             <a:avLst/>
@@ -5315,7 +5316,7 @@
         </p:nvSpPr>
         <p:spPr>
           <a:xfrm>
-            <a:off x="7951440" y="3840604"/>
+            <a:off x="7955436" y="4401370"/>
             <a:ext cx="708186" cy="285783"/>
           </a:xfrm>
           <a:prstGeom prst="rect">
@@ -5380,9 +5381,9 @@
           <p:nvPr/>
         </p:nvCxnSpPr>
         <p:spPr>
-          <a:xfrm flipV="1">
-            <a:off x="6510483" y="3983496"/>
-            <a:ext cx="1440957" cy="31858"/>
+          <a:xfrm>
+            <a:off x="6510483" y="4015354"/>
+            <a:ext cx="1444953" cy="528908"/>
           </a:xfrm>
           <a:prstGeom prst="bentConnector3">
             <a:avLst>
@@ -5427,7 +5428,7 @@
         </p:nvSpPr>
         <p:spPr>
           <a:xfrm>
-            <a:off x="7738788" y="3823821"/>
+            <a:off x="7798329" y="4302898"/>
             <a:ext cx="189257" cy="178683"/>
           </a:xfrm>
           <a:prstGeom prst="rect">
@@ -5670,8 +5671,8 @@
         </p:nvCxnSpPr>
         <p:spPr>
           <a:xfrm rot="5400000" flipH="1" flipV="1">
-            <a:off x="3397849" y="3377774"/>
-            <a:ext cx="800856" cy="245586"/>
+            <a:off x="3482064" y="3472257"/>
+            <a:ext cx="622158" cy="235319"/>
           </a:xfrm>
           <a:prstGeom prst="bentConnector2">
             <a:avLst/>
@@ -5715,7 +5716,7 @@
         </p:nvSpPr>
         <p:spPr>
           <a:xfrm>
-            <a:off x="3921070" y="2926759"/>
+            <a:off x="3910803" y="3105457"/>
             <a:ext cx="1156969" cy="346760"/>
           </a:xfrm>
           <a:prstGeom prst="rect">
@@ -5777,7 +5778,7 @@
         </p:nvSpPr>
         <p:spPr>
           <a:xfrm>
-            <a:off x="5631357" y="2897349"/>
+            <a:off x="5635365" y="3116846"/>
             <a:ext cx="708186" cy="346760"/>
           </a:xfrm>
           <a:prstGeom prst="rect">
@@ -5839,7 +5840,7 @@
         </p:nvSpPr>
         <p:spPr>
           <a:xfrm>
-            <a:off x="5077691" y="2975323"/>
+            <a:off x="5072239" y="3212221"/>
             <a:ext cx="236048" cy="173380"/>
           </a:xfrm>
           <a:prstGeom prst="flowChartDecision">
@@ -5887,15 +5888,13 @@
           </p:cNvPr>
           <p:cNvCxnSpPr>
             <a:cxnSpLocks/>
-            <a:stCxn id="88" idx="3"/>
-            <a:endCxn id="87" idx="1"/>
           </p:cNvCxnSpPr>
           <p:nvPr/>
         </p:nvCxnSpPr>
         <p:spPr>
-          <a:xfrm>
-            <a:off x="5313739" y="3062013"/>
-            <a:ext cx="317618" cy="8716"/>
+          <a:xfrm flipV="1">
+            <a:off x="5313739" y="3293018"/>
+            <a:ext cx="317618" cy="5893"/>
           </a:xfrm>
           <a:prstGeom prst="bentConnector3">
             <a:avLst>
@@ -5940,7 +5939,7 @@
         </p:nvSpPr>
         <p:spPr>
           <a:xfrm>
-            <a:off x="6353644" y="2964291"/>
+            <a:off x="6354253" y="3195360"/>
             <a:ext cx="236048" cy="173380"/>
           </a:xfrm>
           <a:prstGeom prst="flowChartDecision">
@@ -5997,8 +5996,8 @@
         </p:nvCxnSpPr>
         <p:spPr>
           <a:xfrm>
-            <a:off x="6589692" y="3050981"/>
-            <a:ext cx="1334314" cy="173145"/>
+            <a:off x="6590301" y="3282050"/>
+            <a:ext cx="1312856" cy="319260"/>
           </a:xfrm>
           <a:prstGeom prst="bentConnector3">
             <a:avLst>
@@ -6043,7 +6042,7 @@
         </p:nvSpPr>
         <p:spPr>
           <a:xfrm>
-            <a:off x="7924006" y="3081234"/>
+            <a:off x="7903157" y="3458418"/>
             <a:ext cx="802815" cy="285783"/>
           </a:xfrm>
           <a:prstGeom prst="rect">
@@ -6105,7 +6104,7 @@
         </p:nvSpPr>
         <p:spPr>
           <a:xfrm>
-            <a:off x="7924007" y="3438777"/>
+            <a:off x="7903158" y="3815961"/>
             <a:ext cx="802815" cy="285783"/>
           </a:xfrm>
           <a:prstGeom prst="rect">
@@ -6171,8 +6170,8 @@
         </p:nvCxnSpPr>
         <p:spPr>
           <a:xfrm>
-            <a:off x="6589692" y="3050981"/>
-            <a:ext cx="1334315" cy="530688"/>
+            <a:off x="6590301" y="3282050"/>
+            <a:ext cx="1312857" cy="676803"/>
           </a:xfrm>
           <a:prstGeom prst="bentConnector3">
             <a:avLst>
@@ -6871,7 +6870,7 @@
         </p:nvSpPr>
         <p:spPr>
           <a:xfrm>
-            <a:off x="7924006" y="2618033"/>
+            <a:off x="7903156" y="2391826"/>
             <a:ext cx="802815" cy="285783"/>
           </a:xfrm>
           <a:prstGeom prst="rect">
@@ -6938,7 +6937,7 @@
         <p:spPr>
           <a:xfrm>
             <a:off x="6551817" y="2312081"/>
-            <a:ext cx="1372189" cy="448844"/>
+            <a:ext cx="1351339" cy="222637"/>
           </a:xfrm>
           <a:prstGeom prst="bentConnector3">
             <a:avLst>
@@ -6983,7 +6982,7 @@
         </p:nvSpPr>
         <p:spPr>
           <a:xfrm>
-            <a:off x="7938357" y="2250720"/>
+            <a:off x="7914063" y="2014930"/>
             <a:ext cx="802815" cy="285783"/>
           </a:xfrm>
           <a:prstGeom prst="rect">
@@ -7048,9 +7047,9 @@
           <p:nvPr/>
         </p:nvCxnSpPr>
         <p:spPr>
-          <a:xfrm>
-            <a:off x="6551817" y="2312081"/>
-            <a:ext cx="1386540" cy="81531"/>
+          <a:xfrm flipV="1">
+            <a:off x="6551817" y="2157822"/>
+            <a:ext cx="1362246" cy="154259"/>
           </a:xfrm>
           <a:prstGeom prst="bentConnector3">
             <a:avLst>
@@ -7095,7 +7094,7 @@
         </p:nvSpPr>
         <p:spPr>
           <a:xfrm>
-            <a:off x="7919805" y="1854091"/>
+            <a:off x="7919805" y="1610499"/>
             <a:ext cx="802815" cy="285783"/>
           </a:xfrm>
           <a:prstGeom prst="rect">
@@ -7169,8 +7168,8 @@
         </p:nvCxnSpPr>
         <p:spPr>
           <a:xfrm flipV="1">
-            <a:off x="6551817" y="1996983"/>
-            <a:ext cx="1367988" cy="315098"/>
+            <a:off x="6551817" y="1753391"/>
+            <a:ext cx="1367988" cy="558690"/>
           </a:xfrm>
           <a:prstGeom prst="bentConnector3">
             <a:avLst>
@@ -7215,7 +7214,7 @@
         </p:nvSpPr>
         <p:spPr>
           <a:xfrm>
-            <a:off x="7955436" y="615162"/>
+            <a:off x="7938357" y="33731"/>
             <a:ext cx="802815" cy="285783"/>
           </a:xfrm>
           <a:prstGeom prst="rect">
@@ -7272,7 +7271,7 @@
         </p:nvSpPr>
         <p:spPr>
           <a:xfrm>
-            <a:off x="7956213" y="972288"/>
+            <a:off x="7939134" y="390857"/>
             <a:ext cx="802815" cy="285783"/>
           </a:xfrm>
           <a:prstGeom prst="rect">
@@ -7329,7 +7328,7 @@
         </p:nvSpPr>
         <p:spPr>
           <a:xfrm>
-            <a:off x="7934413" y="1367024"/>
+            <a:off x="7917334" y="785593"/>
             <a:ext cx="985596" cy="310801"/>
           </a:xfrm>
           <a:prstGeom prst="rect">
@@ -7395,8 +7394,8 @@
         </p:nvCxnSpPr>
         <p:spPr>
           <a:xfrm flipV="1">
-            <a:off x="6547643" y="758054"/>
-            <a:ext cx="1407793" cy="181360"/>
+            <a:off x="6547643" y="176623"/>
+            <a:ext cx="1390714" cy="762791"/>
           </a:xfrm>
           <a:prstGeom prst="bentConnector3">
             <a:avLst>
@@ -7444,9 +7443,9 @@
           <p:nvPr/>
         </p:nvCxnSpPr>
         <p:spPr>
-          <a:xfrm>
-            <a:off x="6547643" y="939414"/>
-            <a:ext cx="1408570" cy="175766"/>
+          <a:xfrm flipV="1">
+            <a:off x="6547643" y="533749"/>
+            <a:ext cx="1391491" cy="405665"/>
           </a:xfrm>
           <a:prstGeom prst="bentConnector3">
             <a:avLst>
@@ -7496,7 +7495,7 @@
         <p:spPr>
           <a:xfrm>
             <a:off x="6547643" y="939414"/>
-            <a:ext cx="1386770" cy="583011"/>
+            <a:ext cx="1369691" cy="1580"/>
           </a:xfrm>
           <a:prstGeom prst="bentConnector3">
             <a:avLst>
@@ -7750,6 +7749,358 @@
           </a:p>
         </p:txBody>
       </p:sp>
+      <p:sp>
+        <p:nvSpPr>
+          <p:cNvPr id="96" name="Rectangle 8">
+            <a:extLst>
+              <a:ext uri="{FF2B5EF4-FFF2-40B4-BE49-F238E27FC236}">
+                <a16:creationId xmlns:a16="http://schemas.microsoft.com/office/drawing/2014/main" id="{5CBD8EB9-0EFF-4C42-9864-A72CF8576243}"/>
+              </a:ext>
+            </a:extLst>
+          </p:cNvPr>
+          <p:cNvSpPr/>
+          <p:nvPr/>
+        </p:nvSpPr>
+        <p:spPr>
+          <a:xfrm>
+            <a:off x="7903156" y="2721403"/>
+            <a:ext cx="802815" cy="285783"/>
+          </a:xfrm>
+          <a:prstGeom prst="rect">
+            <a:avLst/>
+          </a:prstGeom>
+          <a:ln w="19050">
+            <a:solidFill>
+              <a:srgbClr val="7030A0"/>
+            </a:solidFill>
+          </a:ln>
+          <a:effectLst/>
+        </p:spPr>
+        <p:style>
+          <a:lnRef idx="1">
+            <a:schemeClr val="accent4"/>
+          </a:lnRef>
+          <a:fillRef idx="2">
+            <a:schemeClr val="accent4"/>
+          </a:fillRef>
+          <a:effectRef idx="1">
+            <a:schemeClr val="accent4"/>
+          </a:effectRef>
+          <a:fontRef idx="minor">
+            <a:schemeClr val="dk1"/>
+          </a:fontRef>
+        </p:style>
+        <p:txBody>
+          <a:bodyPr rtlCol="0" anchor="ctr"/>
+          <a:lstStyle/>
+          <a:p>
+            <a:pPr algn="ctr"/>
+            <a:r>
+              <a:rPr lang="en-US" sz="1050" dirty="0" err="1">
+                <a:solidFill>
+                  <a:srgbClr val="7030A0"/>
+                </a:solidFill>
+              </a:rPr>
+              <a:t>JobOwner</a:t>
+            </a:r>
+            <a:r>
+              <a:rPr lang="en-US" sz="1050" dirty="0">
+                <a:solidFill>
+                  <a:srgbClr val="7030A0"/>
+                </a:solidFill>
+              </a:rPr>
+              <a:t> </a:t>
+            </a:r>
+            <a:endParaRPr lang="en-SG" sz="1050" dirty="0">
+              <a:solidFill>
+                <a:srgbClr val="7030A0"/>
+              </a:solidFill>
+            </a:endParaRPr>
+          </a:p>
+        </p:txBody>
+      </p:sp>
+      <p:sp>
+        <p:nvSpPr>
+          <p:cNvPr id="104" name="Rectangle 8">
+            <a:extLst>
+              <a:ext uri="{FF2B5EF4-FFF2-40B4-BE49-F238E27FC236}">
+                <a16:creationId xmlns:a16="http://schemas.microsoft.com/office/drawing/2014/main" id="{50FC044C-01BD-4A81-A146-6CB3554AF062}"/>
+              </a:ext>
+            </a:extLst>
+          </p:cNvPr>
+          <p:cNvSpPr/>
+          <p:nvPr/>
+        </p:nvSpPr>
+        <p:spPr>
+          <a:xfrm>
+            <a:off x="7903157" y="1232887"/>
+            <a:ext cx="802815" cy="285783"/>
+          </a:xfrm>
+          <a:prstGeom prst="rect">
+            <a:avLst/>
+          </a:prstGeom>
+          <a:ln w="19050">
+            <a:solidFill>
+              <a:srgbClr val="7030A0"/>
+            </a:solidFill>
+          </a:ln>
+          <a:effectLst/>
+        </p:spPr>
+        <p:style>
+          <a:lnRef idx="1">
+            <a:schemeClr val="accent4"/>
+          </a:lnRef>
+          <a:fillRef idx="2">
+            <a:schemeClr val="accent4"/>
+          </a:fillRef>
+          <a:effectRef idx="1">
+            <a:schemeClr val="accent4"/>
+          </a:effectRef>
+          <a:fontRef idx="minor">
+            <a:schemeClr val="dk1"/>
+          </a:fontRef>
+        </p:style>
+        <p:txBody>
+          <a:bodyPr rtlCol="0" anchor="ctr"/>
+          <a:lstStyle/>
+          <a:p>
+            <a:pPr algn="ctr"/>
+            <a:r>
+              <a:rPr lang="en-US" sz="1050" dirty="0">
+                <a:solidFill>
+                  <a:srgbClr val="7030A0"/>
+                </a:solidFill>
+              </a:rPr>
+              <a:t>Tag </a:t>
+            </a:r>
+            <a:endParaRPr lang="en-SG" sz="1050" dirty="0">
+              <a:solidFill>
+                <a:srgbClr val="7030A0"/>
+              </a:solidFill>
+            </a:endParaRPr>
+          </a:p>
+        </p:txBody>
+      </p:sp>
+      <p:sp>
+        <p:nvSpPr>
+          <p:cNvPr id="106" name="Rectangle 8">
+            <a:extLst>
+              <a:ext uri="{FF2B5EF4-FFF2-40B4-BE49-F238E27FC236}">
+                <a16:creationId xmlns:a16="http://schemas.microsoft.com/office/drawing/2014/main" id="{6D17DF41-12F9-455A-A2B5-C4264BDCA0EE}"/>
+              </a:ext>
+            </a:extLst>
+          </p:cNvPr>
+          <p:cNvSpPr/>
+          <p:nvPr/>
+        </p:nvSpPr>
+        <p:spPr>
+          <a:xfrm>
+            <a:off x="7914062" y="3031963"/>
+            <a:ext cx="802815" cy="285783"/>
+          </a:xfrm>
+          <a:prstGeom prst="rect">
+            <a:avLst/>
+          </a:prstGeom>
+          <a:ln w="19050">
+            <a:solidFill>
+              <a:srgbClr val="7030A0"/>
+            </a:solidFill>
+          </a:ln>
+          <a:effectLst/>
+        </p:spPr>
+        <p:style>
+          <a:lnRef idx="1">
+            <a:schemeClr val="accent4"/>
+          </a:lnRef>
+          <a:fillRef idx="2">
+            <a:schemeClr val="accent4"/>
+          </a:fillRef>
+          <a:effectRef idx="1">
+            <a:schemeClr val="accent4"/>
+          </a:effectRef>
+          <a:fontRef idx="minor">
+            <a:schemeClr val="dk1"/>
+          </a:fontRef>
+        </p:style>
+        <p:txBody>
+          <a:bodyPr rtlCol="0" anchor="ctr"/>
+          <a:lstStyle/>
+          <a:p>
+            <a:pPr algn="ctr"/>
+            <a:r>
+              <a:rPr lang="en-US" sz="1050" dirty="0" err="1">
+                <a:solidFill>
+                  <a:srgbClr val="7030A0"/>
+                </a:solidFill>
+              </a:rPr>
+              <a:t>JobPriority</a:t>
+            </a:r>
+            <a:r>
+              <a:rPr lang="en-US" sz="1050" dirty="0">
+                <a:solidFill>
+                  <a:srgbClr val="7030A0"/>
+                </a:solidFill>
+              </a:rPr>
+              <a:t> </a:t>
+            </a:r>
+            <a:endParaRPr lang="en-SG" sz="1050" dirty="0">
+              <a:solidFill>
+                <a:srgbClr val="7030A0"/>
+              </a:solidFill>
+            </a:endParaRPr>
+          </a:p>
+        </p:txBody>
+      </p:sp>
+      <p:cxnSp>
+        <p:nvCxnSpPr>
+          <p:cNvPr id="108" name="Elbow Connector 78">
+            <a:extLst>
+              <a:ext uri="{FF2B5EF4-FFF2-40B4-BE49-F238E27FC236}">
+                <a16:creationId xmlns:a16="http://schemas.microsoft.com/office/drawing/2014/main" id="{A47D4034-F509-4F71-A6A3-9C40530F3789}"/>
+              </a:ext>
+            </a:extLst>
+          </p:cNvPr>
+          <p:cNvCxnSpPr>
+            <a:cxnSpLocks/>
+            <a:stCxn id="103" idx="3"/>
+            <a:endCxn id="96" idx="1"/>
+          </p:cNvCxnSpPr>
+          <p:nvPr/>
+        </p:nvCxnSpPr>
+        <p:spPr>
+          <a:xfrm>
+            <a:off x="6551817" y="2312081"/>
+            <a:ext cx="1351339" cy="552214"/>
+          </a:xfrm>
+          <a:prstGeom prst="bentConnector3">
+            <a:avLst>
+              <a:gd name="adj1" fmla="val 50000"/>
+            </a:avLst>
+          </a:prstGeom>
+          <a:ln w="19050">
+            <a:solidFill>
+              <a:srgbClr val="7030A0"/>
+            </a:solidFill>
+            <a:headEnd type="none" w="med" len="med"/>
+            <a:tailEnd type="arrow" w="med" len="med"/>
+          </a:ln>
+          <a:effectLst/>
+        </p:spPr>
+        <p:style>
+          <a:lnRef idx="1">
+            <a:schemeClr val="accent2"/>
+          </a:lnRef>
+          <a:fillRef idx="2">
+            <a:schemeClr val="accent2"/>
+          </a:fillRef>
+          <a:effectRef idx="1">
+            <a:schemeClr val="accent2"/>
+          </a:effectRef>
+          <a:fontRef idx="minor">
+            <a:schemeClr val="dk1"/>
+          </a:fontRef>
+        </p:style>
+      </p:cxnSp>
+      <p:cxnSp>
+        <p:nvCxnSpPr>
+          <p:cNvPr id="109" name="Elbow Connector 78">
+            <a:extLst>
+              <a:ext uri="{FF2B5EF4-FFF2-40B4-BE49-F238E27FC236}">
+                <a16:creationId xmlns:a16="http://schemas.microsoft.com/office/drawing/2014/main" id="{6F8EA660-4A49-4239-87F4-C7C06F0FD6CC}"/>
+              </a:ext>
+            </a:extLst>
+          </p:cNvPr>
+          <p:cNvCxnSpPr>
+            <a:cxnSpLocks/>
+            <a:stCxn id="103" idx="3"/>
+            <a:endCxn id="104" idx="1"/>
+          </p:cNvCxnSpPr>
+          <p:nvPr/>
+        </p:nvCxnSpPr>
+        <p:spPr>
+          <a:xfrm flipV="1">
+            <a:off x="6551817" y="1375779"/>
+            <a:ext cx="1351340" cy="936302"/>
+          </a:xfrm>
+          <a:prstGeom prst="bentConnector3">
+            <a:avLst>
+              <a:gd name="adj1" fmla="val 50000"/>
+            </a:avLst>
+          </a:prstGeom>
+          <a:ln w="19050">
+            <a:solidFill>
+              <a:srgbClr val="7030A0"/>
+            </a:solidFill>
+            <a:headEnd type="none" w="med" len="med"/>
+            <a:tailEnd type="arrow" w="med" len="med"/>
+          </a:ln>
+          <a:effectLst/>
+        </p:spPr>
+        <p:style>
+          <a:lnRef idx="1">
+            <a:schemeClr val="accent2"/>
+          </a:lnRef>
+          <a:fillRef idx="2">
+            <a:schemeClr val="accent2"/>
+          </a:fillRef>
+          <a:effectRef idx="1">
+            <a:schemeClr val="accent2"/>
+          </a:effectRef>
+          <a:fontRef idx="minor">
+            <a:schemeClr val="dk1"/>
+          </a:fontRef>
+        </p:style>
+      </p:cxnSp>
+      <p:cxnSp>
+        <p:nvCxnSpPr>
+          <p:cNvPr id="111" name="Elbow Connector 78">
+            <a:extLst>
+              <a:ext uri="{FF2B5EF4-FFF2-40B4-BE49-F238E27FC236}">
+                <a16:creationId xmlns:a16="http://schemas.microsoft.com/office/drawing/2014/main" id="{14F9C892-C3FD-4FB3-8EDB-1155D51E14C6}"/>
+              </a:ext>
+            </a:extLst>
+          </p:cNvPr>
+          <p:cNvCxnSpPr>
+            <a:cxnSpLocks/>
+            <a:stCxn id="103" idx="3"/>
+            <a:endCxn id="106" idx="1"/>
+          </p:cNvCxnSpPr>
+          <p:nvPr/>
+        </p:nvCxnSpPr>
+        <p:spPr>
+          <a:xfrm>
+            <a:off x="6551817" y="2312081"/>
+            <a:ext cx="1362245" cy="862774"/>
+          </a:xfrm>
+          <a:prstGeom prst="bentConnector3">
+            <a:avLst>
+              <a:gd name="adj1" fmla="val 50000"/>
+            </a:avLst>
+          </a:prstGeom>
+          <a:ln w="19050">
+            <a:solidFill>
+              <a:srgbClr val="7030A0"/>
+            </a:solidFill>
+            <a:headEnd type="none" w="med" len="med"/>
+            <a:tailEnd type="arrow" w="med" len="med"/>
+          </a:ln>
+          <a:effectLst/>
+        </p:spPr>
+        <p:style>
+          <a:lnRef idx="1">
+            <a:schemeClr val="accent2"/>
+          </a:lnRef>
+          <a:fillRef idx="2">
+            <a:schemeClr val="accent2"/>
+          </a:fillRef>
+          <a:effectRef idx="1">
+            <a:schemeClr val="accent2"/>
+          </a:effectRef>
+          <a:fontRef idx="minor">
+            <a:schemeClr val="dk1"/>
+          </a:fontRef>
+        </p:style>
+      </p:cxnSp>
     </p:spTree>
     <p:extLst>
       <p:ext uri="{BB962C8B-B14F-4D97-AF65-F5344CB8AC3E}">

</xml_diff>